<commit_message>
Added Intermediate Scratch Lessons
</commit_message>
<xml_diff>
--- a/en/ProgrammingLessons/beginner/scratch-BasicLineFollower.pptx
+++ b/en/ProgrammingLessons/beginner/scratch-BasicLineFollower.pptx
@@ -228,7 +228,7 @@
           <a:p>
             <a:fld id="{F8D9B3D7-15CB-9343-AA49-EFB5A8F33F18}" type="datetimeFigureOut">
               <a:rPr lang="en-US" smtClean="0"/>
-              <a:t>12/21/19</a:t>
+              <a:t>12/25/19</a:t>
             </a:fld>
             <a:endParaRPr lang="en-US"/>
           </a:p>
@@ -394,7 +394,7 @@
           <a:p>
             <a:fld id="{FD3EFF1E-85A1-6640-AFB9-C38833E80A84}" type="datetimeFigureOut">
               <a:rPr lang="en-US" smtClean="0"/>
-              <a:t>12/21/19</a:t>
+              <a:t>12/25/19</a:t>
             </a:fld>
             <a:endParaRPr lang="en-US"/>
           </a:p>
@@ -1359,7 +1359,7 @@
 </file>
 
 <file path=ppt/slideLayouts/slideLayout1.xml><?xml version="1.0" encoding="utf-8"?>
-<p:sldLayout xmlns:a="http://schemas.openxmlformats.org/drawingml/2006/main" xmlns:r="http://schemas.openxmlformats.org/officeDocument/2006/relationships" xmlns:p="http://schemas.openxmlformats.org/presentationml/2006/main" showMasterSp="0" preserve="1">
+<p:sldLayout xmlns:a="http://schemas.openxmlformats.org/drawingml/2006/main" xmlns:r="http://schemas.openxmlformats.org/officeDocument/2006/relationships" xmlns:p="http://schemas.openxmlformats.org/presentationml/2006/main" showMasterSp="0" preserve="1" userDrawn="1">
   <p:cSld name="Title Slide">
     <p:spTree>
       <p:nvGrpSpPr>
@@ -1392,11 +1392,13 @@
           </a:xfrm>
         </p:spPr>
         <p:txBody>
-          <a:bodyPr/>
+          <a:bodyPr>
+            <a:noAutofit/>
+          </a:bodyPr>
           <a:lstStyle>
             <a:lvl1pPr marL="0" indent="0" algn="ctr">
               <a:buNone/>
-              <a:defRPr b="0" cap="none" spc="120" baseline="0">
+              <a:defRPr sz="2400" b="0" cap="none" spc="120" baseline="0">
                 <a:solidFill>
                   <a:schemeClr val="tx2"/>
                 </a:solidFill>
@@ -1486,10 +1488,9 @@
           </a:lstStyle>
           <a:p>
             <a:r>
-              <a:rPr lang="en-US"/>
+              <a:rPr lang="en-US" dirty="0"/>
               <a:t>Click to edit Master subtitle style</a:t>
             </a:r>
-            <a:endParaRPr lang="en-US" dirty="0"/>
           </a:p>
         </p:txBody>
       </p:sp>
@@ -1510,7 +1511,7 @@
           <a:p>
             <a:fld id="{B5E365AB-73D3-9746-B39E-58B72EE2EEA3}" type="datetime1">
               <a:rPr lang="en-US" smtClean="0"/>
-              <a:t>12/21/19</a:t>
+              <a:t>12/25/19</a:t>
             </a:fld>
             <a:endParaRPr lang="en-US"/>
           </a:p>
@@ -1699,40 +1700,6 @@
       </p:sp>
       <p:sp>
         <p:nvSpPr>
-          <p:cNvPr id="14" name="Title 1"/>
-          <p:cNvSpPr>
-            <a:spLocks noGrp="1"/>
-          </p:cNvSpPr>
-          <p:nvPr>
-            <p:ph type="ctrTitle" hasCustomPrompt="1"/>
-          </p:nvPr>
-        </p:nvSpPr>
-        <p:spPr>
-          <a:xfrm>
-            <a:off x="502903" y="5741850"/>
-            <a:ext cx="8117227" cy="602769"/>
-          </a:xfrm>
-        </p:spPr>
-        <p:txBody>
-          <a:bodyPr>
-            <a:noAutofit/>
-          </a:bodyPr>
-          <a:lstStyle>
-            <a:lvl1pPr>
-              <a:defRPr sz="2800"/>
-            </a:lvl1pPr>
-          </a:lstStyle>
-          <a:p>
-            <a:pPr algn="ctr"/>
-            <a:r>
-              <a:rPr lang="en-US" sz="3200" dirty="0"/>
-              <a:t>BEGINNER PROGRAMMING LESSON</a:t>
-            </a:r>
-          </a:p>
-        </p:txBody>
-      </p:sp>
-      <p:sp>
-        <p:nvSpPr>
           <p:cNvPr id="15" name="TextBox 14"/>
           <p:cNvSpPr txBox="1"/>
           <p:nvPr/>
@@ -1850,7 +1817,7 @@
         </p:nvSpPr>
         <p:spPr>
           <a:xfrm>
-            <a:off x="8913670" y="-13853"/>
+            <a:off x="8913670" y="-5540"/>
             <a:ext cx="91440" cy="6858000"/>
           </a:xfrm>
           <a:prstGeom prst="rect">
@@ -1880,35 +1847,6 @@
           </a:fontRef>
         </p:style>
       </p:sp>
-      <p:pic>
-        <p:nvPicPr>
-          <p:cNvPr id="19" name="Picture 18" descr="A picture containing drawing&#10;&#10;Description automatically generated">
-            <a:extLst>
-              <a:ext uri="{FF2B5EF4-FFF2-40B4-BE49-F238E27FC236}">
-                <a16:creationId xmlns:a16="http://schemas.microsoft.com/office/drawing/2014/main" id="{A2C3467C-D184-9143-B2AE-E3D838EEEB6F}"/>
-              </a:ext>
-            </a:extLst>
-          </p:cNvPr>
-          <p:cNvPicPr>
-            <a:picLocks noChangeAspect="1"/>
-          </p:cNvPicPr>
-          <p:nvPr userDrawn="1"/>
-        </p:nvPicPr>
-        <p:blipFill rotWithShape="1">
-          <a:blip r:embed="rId2"/>
-          <a:srcRect l="1617" t="7031" r="4033" b="8124"/>
-          <a:stretch/>
-        </p:blipFill>
-        <p:spPr>
-          <a:xfrm>
-            <a:off x="89513" y="25985"/>
-            <a:ext cx="8627349" cy="3250097"/>
-          </a:xfrm>
-          <a:prstGeom prst="rect">
-            <a:avLst/>
-          </a:prstGeom>
-        </p:spPr>
-      </p:pic>
     </p:spTree>
     <p:extLst>
       <p:ext uri="{BB962C8B-B14F-4D97-AF65-F5344CB8AC3E}">
@@ -2029,7 +1967,7 @@
           <a:p>
             <a:fld id="{A4950C5A-BD1B-D24B-8B68-3C46332E0112}" type="datetime1">
               <a:rPr lang="en-US" smtClean="0"/>
-              <a:t>12/21/19</a:t>
+              <a:t>12/25/19</a:t>
             </a:fld>
             <a:endParaRPr lang="en-US"/>
           </a:p>
@@ -2219,7 +2157,7 @@
           <a:p>
             <a:fld id="{C2C1B08F-F0D7-CD42-B488-0B5976CFC567}" type="datetime1">
               <a:rPr lang="en-US" smtClean="0"/>
-              <a:t>12/21/19</a:t>
+              <a:t>12/25/19</a:t>
             </a:fld>
             <a:endParaRPr lang="en-US"/>
           </a:p>
@@ -2421,7 +2359,7 @@
           <a:p>
             <a:fld id="{DFE011A2-C704-D74B-901D-4BF2A48779EF}" type="datetime1">
               <a:rPr lang="en-US" smtClean="0"/>
-              <a:t>12/21/19</a:t>
+              <a:t>12/25/19</a:t>
             </a:fld>
             <a:endParaRPr lang="en-US"/>
           </a:p>
@@ -2593,7 +2531,7 @@
           <a:p>
             <a:fld id="{CB5E97F4-EB3B-5345-A39B-58A6CB322A02}" type="datetime1">
               <a:rPr lang="en-US" smtClean="0"/>
-              <a:t>12/21/19</a:t>
+              <a:t>12/25/19</a:t>
             </a:fld>
             <a:endParaRPr lang="en-US"/>
           </a:p>
@@ -2842,7 +2780,7 @@
           <a:p>
             <a:fld id="{0F0CFA83-E9E7-2A40-AEAD-EA833EF2FB40}" type="datetime1">
               <a:rPr lang="en-US" smtClean="0"/>
-              <a:t>12/21/19</a:t>
+              <a:t>12/25/19</a:t>
             </a:fld>
             <a:endParaRPr lang="en-US"/>
           </a:p>
@@ -3075,7 +3013,7 @@
           <a:p>
             <a:fld id="{71288DB1-7E3B-2749-B8EA-91FB00995D98}" type="datetime1">
               <a:rPr lang="en-US" smtClean="0"/>
-              <a:t>12/21/19</a:t>
+              <a:t>12/25/19</a:t>
             </a:fld>
             <a:endParaRPr lang="en-US"/>
           </a:p>
@@ -3443,7 +3381,7 @@
           <a:p>
             <a:fld id="{0436B4BE-F80E-D84E-9524-FB9C09FE6337}" type="datetime1">
               <a:rPr lang="en-US" smtClean="0"/>
-              <a:t>12/21/19</a:t>
+              <a:t>12/25/19</a:t>
             </a:fld>
             <a:endParaRPr lang="en-US"/>
           </a:p>
@@ -3564,7 +3502,7 @@
           <a:p>
             <a:fld id="{40F2727A-813D-164B-A871-F68C6369A23D}" type="datetime1">
               <a:rPr lang="en-US" smtClean="0"/>
-              <a:t>12/21/19</a:t>
+              <a:t>12/25/19</a:t>
             </a:fld>
             <a:endParaRPr lang="en-US"/>
           </a:p>
@@ -3663,7 +3601,7 @@
           <a:p>
             <a:fld id="{68B2A911-E579-FA44-86DD-523D726D6737}" type="datetime1">
               <a:rPr lang="en-US" smtClean="0"/>
-              <a:t>12/21/19</a:t>
+              <a:t>12/25/19</a:t>
             </a:fld>
             <a:endParaRPr lang="en-US"/>
           </a:p>
@@ -3942,7 +3880,7 @@
           <a:p>
             <a:fld id="{79433036-B722-6E4B-9829-8F4AF5446D0A}" type="datetime1">
               <a:rPr lang="en-US" smtClean="0"/>
-              <a:t>12/21/19</a:t>
+              <a:t>12/25/19</a:t>
             </a:fld>
             <a:endParaRPr lang="en-US"/>
           </a:p>
@@ -4125,7 +4063,7 @@
           <a:p>
             <a:fld id="{1BE44021-E2FF-0343-BB35-14C5653F6DCB}" type="datetime1">
               <a:rPr lang="en-US" smtClean="0"/>
-              <a:t>12/21/19</a:t>
+              <a:t>12/25/19</a:t>
             </a:fld>
             <a:endParaRPr lang="en-US"/>
           </a:p>
@@ -4392,7 +4330,7 @@
           <a:p>
             <a:fld id="{D82CD683-AF56-FE47-BDCE-BFE65B62C83F}" type="datetime1">
               <a:rPr lang="en-US" smtClean="0"/>
-              <a:t>12/21/19</a:t>
+              <a:t>12/25/19</a:t>
             </a:fld>
             <a:endParaRPr lang="en-US"/>
           </a:p>
@@ -4564,7 +4502,7 @@
           <a:p>
             <a:fld id="{972EB2B0-766F-9B4F-B153-6ABA39302339}" type="datetime1">
               <a:rPr lang="en-US" smtClean="0"/>
-              <a:t>12/21/19</a:t>
+              <a:t>12/25/19</a:t>
             </a:fld>
             <a:endParaRPr lang="en-US"/>
           </a:p>
@@ -4746,7 +4684,7 @@
           <a:p>
             <a:fld id="{8244ECF9-2EE7-454A-81DF-D0A7465A20D2}" type="datetime1">
               <a:rPr lang="en-US" smtClean="0"/>
-              <a:t>12/21/19</a:t>
+              <a:t>12/25/19</a:t>
             </a:fld>
             <a:endParaRPr lang="en-US"/>
           </a:p>
@@ -5004,7 +4942,7 @@
           <a:p>
             <a:fld id="{24F64199-EB07-B74B-B7FB-754FFF43DD43}" type="datetime1">
               <a:rPr lang="en-US" smtClean="0"/>
-              <a:t>12/21/19</a:t>
+              <a:t>12/25/19</a:t>
             </a:fld>
             <a:endParaRPr lang="en-US"/>
           </a:p>
@@ -5308,7 +5246,7 @@
           <a:p>
             <a:fld id="{5DEABBF2-6D9D-9D43-831C-9EED32A3E9D7}" type="datetime1">
               <a:rPr lang="en-US" smtClean="0"/>
-              <a:t>12/21/19</a:t>
+              <a:t>12/25/19</a:t>
             </a:fld>
             <a:endParaRPr lang="en-US"/>
           </a:p>
@@ -5763,7 +5701,7 @@
           <a:p>
             <a:fld id="{0C70CE91-D2F2-7A44-9D58-B74E1A35C0C1}" type="datetime1">
               <a:rPr lang="en-US" smtClean="0"/>
-              <a:t>12/21/19</a:t>
+              <a:t>12/25/19</a:t>
             </a:fld>
             <a:endParaRPr lang="en-US"/>
           </a:p>
@@ -5892,7 +5830,7 @@
           <a:p>
             <a:fld id="{93638639-E0B6-6F4A-BD81-ABABAAA74D03}" type="datetime1">
               <a:rPr lang="en-US" smtClean="0"/>
-              <a:t>12/21/19</a:t>
+              <a:t>12/25/19</a:t>
             </a:fld>
             <a:endParaRPr lang="en-US"/>
           </a:p>
@@ -5999,7 +5937,7 @@
           <a:p>
             <a:fld id="{1F82FA13-E0B4-1D4B-9A75-AEBAA3298A65}" type="datetime1">
               <a:rPr lang="en-US" smtClean="0"/>
-              <a:t>12/21/19</a:t>
+              <a:t>12/25/19</a:t>
             </a:fld>
             <a:endParaRPr lang="en-US"/>
           </a:p>
@@ -6258,7 +6196,7 @@
           <a:p>
             <a:fld id="{676F4D46-ABB3-8842-81F5-73672BDA177B}" type="datetime1">
               <a:rPr lang="en-US" smtClean="0"/>
-              <a:t>12/21/19</a:t>
+              <a:t>12/25/19</a:t>
             </a:fld>
             <a:endParaRPr lang="en-US"/>
           </a:p>
@@ -6567,7 +6505,7 @@
           <a:p>
             <a:fld id="{AF589E03-46B4-DF44-865E-52006E59A3DE}" type="datetime1">
               <a:rPr lang="en-US" smtClean="0"/>
-              <a:t>12/21/19</a:t>
+              <a:t>12/25/19</a:t>
             </a:fld>
             <a:endParaRPr lang="en-US"/>
           </a:p>
@@ -6878,7 +6816,7 @@
           <a:p>
             <a:fld id="{7D8B98D3-1B23-0B41-A1CE-90E188488B87}" type="datetime1">
               <a:rPr lang="en-US" smtClean="0"/>
-              <a:t>12/21/19</a:t>
+              <a:t>12/25/19</a:t>
             </a:fld>
             <a:endParaRPr lang="en-US"/>
           </a:p>
@@ -7634,7 +7572,7 @@
           <a:p>
             <a:fld id="{E006E18B-37E4-F344-A1BF-2224B4BA13D0}" type="datetime1">
               <a:rPr lang="en-US" smtClean="0"/>
-              <a:t>12/21/19</a:t>
+              <a:t>12/25/19</a:t>
             </a:fld>
             <a:endParaRPr lang="en-US"/>
           </a:p>
@@ -8054,13 +7992,24 @@
             <p:ph type="subTitle" idx="1"/>
           </p:nvPr>
         </p:nvSpPr>
-        <p:spPr/>
+        <p:spPr>
+          <a:xfrm>
+            <a:off x="1143000" y="3122424"/>
+            <a:ext cx="6858000" cy="914400"/>
+          </a:xfrm>
+        </p:spPr>
         <p:txBody>
           <a:bodyPr/>
           <a:lstStyle/>
           <a:p>
             <a:r>
               <a:rPr lang="en-US" dirty="0"/>
+              <a:t>EV3 CLASSROOM: </a:t>
+            </a:r>
+          </a:p>
+          <a:p>
+            <a:r>
+              <a:rPr lang="en-US" dirty="0"/>
               <a:t>Basic Line Follower</a:t>
             </a:r>
           </a:p>
@@ -8068,33 +8017,78 @@
       </p:sp>
       <p:sp>
         <p:nvSpPr>
-          <p:cNvPr id="3" name="Title 2"/>
+          <p:cNvPr id="7" name="Title 1">
+            <a:extLst>
+              <a:ext uri="{FF2B5EF4-FFF2-40B4-BE49-F238E27FC236}">
+                <a16:creationId xmlns:a16="http://schemas.microsoft.com/office/drawing/2014/main" id="{8C17733D-748B-0C49-B987-2B3AC730727F}"/>
+              </a:ext>
+            </a:extLst>
+          </p:cNvPr>
           <p:cNvSpPr>
             <a:spLocks noGrp="1"/>
           </p:cNvSpPr>
           <p:nvPr>
-            <p:ph type="ctrTitle"/>
-          </p:nvPr>
-        </p:nvSpPr>
-        <p:spPr/>
-        <p:txBody>
-          <a:bodyPr/>
-          <a:lstStyle/>
-          <a:p>
-            <a:pPr algn="ctr"/>
-            <a:r>
-              <a:rPr lang="en-US" dirty="0"/>
-              <a:t>Beginner Programming Lesson</a:t>
+            <p:ph type="ctrTitle" idx="4294967295" hasCustomPrompt="1"/>
+          </p:nvPr>
+        </p:nvSpPr>
+        <p:spPr>
+          <a:xfrm>
+            <a:off x="4868091" y="272833"/>
+            <a:ext cx="3897684" cy="1598052"/>
+          </a:xfrm>
+        </p:spPr>
+        <p:txBody>
+          <a:bodyPr>
+            <a:noAutofit/>
+          </a:bodyPr>
+          <a:lstStyle>
+            <a:lvl1pPr>
+              <a:defRPr sz="2800"/>
+            </a:lvl1pPr>
+          </a:lstStyle>
+          <a:p>
+            <a:r>
+              <a:rPr lang="en-US" sz="3200" dirty="0"/>
+              <a:t>BEGINNER PROGRAMMING LESSON</a:t>
             </a:r>
           </a:p>
         </p:txBody>
       </p:sp>
       <p:pic>
         <p:nvPicPr>
-          <p:cNvPr id="5" name="Picture 4" descr="A close up of a sign&#10;&#10;Description automatically generated">
+          <p:cNvPr id="8" name="Picture 7" descr="A picture containing drawing&#10;&#10;Description automatically generated">
             <a:extLst>
               <a:ext uri="{FF2B5EF4-FFF2-40B4-BE49-F238E27FC236}">
-                <a16:creationId xmlns:a16="http://schemas.microsoft.com/office/drawing/2014/main" id="{E0941C80-18F8-8D48-A8CD-DC25A583EDBC}"/>
+                <a16:creationId xmlns:a16="http://schemas.microsoft.com/office/drawing/2014/main" id="{973E5382-8DCC-1F48-AD9A-1B0C53A27C1E}"/>
+              </a:ext>
+            </a:extLst>
+          </p:cNvPr>
+          <p:cNvPicPr>
+            <a:picLocks noChangeAspect="1"/>
+          </p:cNvPicPr>
+          <p:nvPr/>
+        </p:nvPicPr>
+        <p:blipFill rotWithShape="1">
+          <a:blip r:embed="rId2"/>
+          <a:srcRect l="1617" t="7031" r="4033" b="8124"/>
+          <a:stretch/>
+        </p:blipFill>
+        <p:spPr>
+          <a:xfrm>
+            <a:off x="129863" y="209018"/>
+            <a:ext cx="4442137" cy="1673443"/>
+          </a:xfrm>
+          <a:prstGeom prst="rect">
+            <a:avLst/>
+          </a:prstGeom>
+        </p:spPr>
+      </p:pic>
+      <p:pic>
+        <p:nvPicPr>
+          <p:cNvPr id="9" name="Picture 8" descr="A close up of a sign&#10;&#10;Description automatically generated">
+            <a:extLst>
+              <a:ext uri="{FF2B5EF4-FFF2-40B4-BE49-F238E27FC236}">
+                <a16:creationId xmlns:a16="http://schemas.microsoft.com/office/drawing/2014/main" id="{D77385C0-1A80-B143-BD94-DE5ED83EF8F0}"/>
               </a:ext>
             </a:extLst>
           </p:cNvPr>
@@ -8104,15 +8098,21 @@
           <p:nvPr/>
         </p:nvPicPr>
         <p:blipFill>
-          <a:blip r:embed="rId2"/>
+          <a:blip r:embed="rId3">
+            <a:extLst>
+              <a:ext uri="{28A0092B-C50C-407E-A947-70E740481C1C}">
+                <a14:useLocalDpi xmlns:a14="http://schemas.microsoft.com/office/drawing/2010/main" val="0"/>
+              </a:ext>
+            </a:extLst>
+          </a:blip>
           <a:stretch>
             <a:fillRect/>
           </a:stretch>
         </p:blipFill>
         <p:spPr>
-          <a:xfrm rot="905751">
-            <a:off x="7371419" y="387218"/>
-            <a:ext cx="1124670" cy="1101589"/>
+          <a:xfrm>
+            <a:off x="3730120" y="4883748"/>
+            <a:ext cx="1444298" cy="1444298"/>
           </a:xfrm>
           <a:prstGeom prst="rect">
             <a:avLst/>

</xml_diff>